<commit_message>
Build script added, changes to the workflow, data model and actions updated
</commit_message>
<xml_diff>
--- a/docs/Workflow.pptx
+++ b/docs/Workflow.pptx
@@ -199,7 +199,7 @@
           <a:p>
             <a:fld id="{D21F00F9-2F8B-2742-9A73-D846E2144938}" type="datetimeFigureOut">
               <a:rPr lang="en-US" smtClean="0"/>
-              <a:t>6/23/18</a:t>
+              <a:t>6/24/18</a:t>
             </a:fld>
             <a:endParaRPr lang="en-US"/>
           </a:p>
@@ -598,7 +598,7 @@
           <a:p>
             <a:fld id="{A7970A72-C7A8-9E4C-931E-F542494A6764}" type="datetimeFigureOut">
               <a:rPr lang="en-US" smtClean="0"/>
-              <a:t>6/23/18</a:t>
+              <a:t>6/24/18</a:t>
             </a:fld>
             <a:endParaRPr lang="en-US"/>
           </a:p>
@@ -763,7 +763,7 @@
           <a:p>
             <a:fld id="{A7970A72-C7A8-9E4C-931E-F542494A6764}" type="datetimeFigureOut">
               <a:rPr lang="en-US" smtClean="0"/>
-              <a:t>6/23/18</a:t>
+              <a:t>6/24/18</a:t>
             </a:fld>
             <a:endParaRPr lang="en-US"/>
           </a:p>
@@ -938,7 +938,7 @@
           <a:p>
             <a:fld id="{A7970A72-C7A8-9E4C-931E-F542494A6764}" type="datetimeFigureOut">
               <a:rPr lang="en-US" smtClean="0"/>
-              <a:t>6/23/18</a:t>
+              <a:t>6/24/18</a:t>
             </a:fld>
             <a:endParaRPr lang="en-US"/>
           </a:p>
@@ -1103,7 +1103,7 @@
           <a:p>
             <a:fld id="{A7970A72-C7A8-9E4C-931E-F542494A6764}" type="datetimeFigureOut">
               <a:rPr lang="en-US" smtClean="0"/>
-              <a:t>6/23/18</a:t>
+              <a:t>6/24/18</a:t>
             </a:fld>
             <a:endParaRPr lang="en-US"/>
           </a:p>
@@ -1344,7 +1344,7 @@
           <a:p>
             <a:fld id="{A7970A72-C7A8-9E4C-931E-F542494A6764}" type="datetimeFigureOut">
               <a:rPr lang="en-US" smtClean="0"/>
-              <a:t>6/23/18</a:t>
+              <a:t>6/24/18</a:t>
             </a:fld>
             <a:endParaRPr lang="en-US"/>
           </a:p>
@@ -1571,7 +1571,7 @@
           <a:p>
             <a:fld id="{A7970A72-C7A8-9E4C-931E-F542494A6764}" type="datetimeFigureOut">
               <a:rPr lang="en-US" smtClean="0"/>
-              <a:t>6/23/18</a:t>
+              <a:t>6/24/18</a:t>
             </a:fld>
             <a:endParaRPr lang="en-US"/>
           </a:p>
@@ -1933,7 +1933,7 @@
           <a:p>
             <a:fld id="{A7970A72-C7A8-9E4C-931E-F542494A6764}" type="datetimeFigureOut">
               <a:rPr lang="en-US" smtClean="0"/>
-              <a:t>6/23/18</a:t>
+              <a:t>6/24/18</a:t>
             </a:fld>
             <a:endParaRPr lang="en-US"/>
           </a:p>
@@ -2046,7 +2046,7 @@
           <a:p>
             <a:fld id="{A7970A72-C7A8-9E4C-931E-F542494A6764}" type="datetimeFigureOut">
               <a:rPr lang="en-US" smtClean="0"/>
-              <a:t>6/23/18</a:t>
+              <a:t>6/24/18</a:t>
             </a:fld>
             <a:endParaRPr lang="en-US"/>
           </a:p>
@@ -2136,7 +2136,7 @@
           <a:p>
             <a:fld id="{A7970A72-C7A8-9E4C-931E-F542494A6764}" type="datetimeFigureOut">
               <a:rPr lang="en-US" smtClean="0"/>
-              <a:t>6/23/18</a:t>
+              <a:t>6/24/18</a:t>
             </a:fld>
             <a:endParaRPr lang="en-US"/>
           </a:p>
@@ -2408,7 +2408,7 @@
           <a:p>
             <a:fld id="{A7970A72-C7A8-9E4C-931E-F542494A6764}" type="datetimeFigureOut">
               <a:rPr lang="en-US" smtClean="0"/>
-              <a:t>6/23/18</a:t>
+              <a:t>6/24/18</a:t>
             </a:fld>
             <a:endParaRPr lang="en-US"/>
           </a:p>
@@ -2656,7 +2656,7 @@
           <a:p>
             <a:fld id="{A7970A72-C7A8-9E4C-931E-F542494A6764}" type="datetimeFigureOut">
               <a:rPr lang="en-US" smtClean="0"/>
-              <a:t>6/23/18</a:t>
+              <a:t>6/24/18</a:t>
             </a:fld>
             <a:endParaRPr lang="en-US"/>
           </a:p>
@@ -2864,7 +2864,7 @@
           <a:p>
             <a:fld id="{A7970A72-C7A8-9E4C-931E-F542494A6764}" type="datetimeFigureOut">
               <a:rPr lang="en-US" smtClean="0"/>
-              <a:t>6/23/18</a:t>
+              <a:t>6/24/18</a:t>
             </a:fld>
             <a:endParaRPr lang="en-US"/>
           </a:p>
@@ -4015,43 +4015,13 @@
       </p:grpSpPr>
       <p:sp>
         <p:nvSpPr>
-          <p:cNvPr id="5" name="TextBox 4"/>
-          <p:cNvSpPr txBox="1"/>
-          <p:nvPr/>
-        </p:nvSpPr>
-        <p:spPr>
-          <a:xfrm>
-            <a:off x="277792" y="300942"/>
-            <a:ext cx="3611302" cy="4524315"/>
-          </a:xfrm>
-          <a:prstGeom prst="rect">
-            <a:avLst/>
-          </a:prstGeom>
-          <a:noFill/>
-        </p:spPr>
-        <p:txBody>
-          <a:bodyPr wrap="square" rtlCol="0">
-            <a:spAutoFit/>
-          </a:bodyPr>
-          <a:lstStyle/>
-          <a:p>
-            <a:r>
-              <a:rPr lang="en-US" sz="7200" b="1" u="sng" dirty="0" smtClean="0"/>
-              <a:t>Data Model: Smart Contract</a:t>
-            </a:r>
-            <a:endParaRPr lang="en-US" sz="7200" b="1" u="sng" dirty="0"/>
-          </a:p>
-        </p:txBody>
-      </p:sp>
-      <p:sp>
-        <p:nvSpPr>
           <p:cNvPr id="3" name="Rectangle 2"/>
           <p:cNvSpPr/>
           <p:nvPr/>
         </p:nvSpPr>
         <p:spPr>
           <a:xfrm>
-            <a:off x="4863295" y="3050004"/>
+            <a:off x="3636379" y="3142602"/>
             <a:ext cx="3343156" cy="3269774"/>
           </a:xfrm>
           <a:prstGeom prst="rect">
@@ -4078,9 +4048,14 @@
           <a:p>
             <a:pPr algn="ctr"/>
             <a:r>
+              <a:rPr lang="en-US" b="1" u="sng" dirty="0"/>
+              <a:t>Citizen: Data </a:t>
+            </a:r>
+            <a:r>
               <a:rPr lang="en-US" b="1" u="sng" dirty="0" smtClean="0"/>
-              <a:t>Citizen</a:t>
-            </a:r>
+              <a:t>Model</a:t>
+            </a:r>
+            <a:endParaRPr lang="en-US" b="1" u="sng" dirty="0" smtClean="0"/>
           </a:p>
           <a:p>
             <a:pPr algn="ctr"/>
@@ -4089,63 +4064,67 @@
           <a:p>
             <a:pPr algn="ctr"/>
             <a:r>
+              <a:rPr lang="en-US" b="1" dirty="0"/>
+              <a:t>account_name </a:t>
+            </a:r>
+            <a:r>
+              <a:rPr lang="en-US" dirty="0"/>
+              <a:t>account</a:t>
+            </a:r>
+          </a:p>
+          <a:p>
+            <a:pPr algn="ctr"/>
+            <a:r>
               <a:rPr lang="en-US" b="1" dirty="0" smtClean="0"/>
-              <a:t>String</a:t>
+              <a:t>asset </a:t>
+            </a:r>
+            <a:r>
+              <a:rPr lang="en-US" dirty="0"/>
+              <a:t>citizen_bal</a:t>
+            </a:r>
+          </a:p>
+          <a:p>
+            <a:pPr algn="ctr"/>
+            <a:r>
+              <a:rPr lang="en-US" b="1" dirty="0" smtClean="0"/>
+              <a:t>string </a:t>
             </a:r>
             <a:r>
               <a:rPr lang="en-US" dirty="0" smtClean="0"/>
-              <a:t> Name</a:t>
-            </a:r>
-          </a:p>
-          <a:p>
-            <a:pPr algn="ctr"/>
+              <a:t>citizen_name</a:t>
+            </a:r>
+            <a:endParaRPr lang="en-US" dirty="0"/>
+          </a:p>
+          <a:p>
+            <a:pPr algn="ctr"/>
+            <a:r>
+              <a:rPr lang="en-US" b="1" dirty="0"/>
+              <a:t>b</a:t>
+            </a:r>
             <a:r>
               <a:rPr lang="en-US" b="1" dirty="0" smtClean="0"/>
-              <a:t>String</a:t>
-            </a:r>
-            <a:r>
-              <a:rPr lang="en-US" dirty="0" smtClean="0"/>
-              <a:t> IDNumber</a:t>
-            </a:r>
-          </a:p>
-          <a:p>
-            <a:pPr algn="ctr"/>
+              <a:t>ool </a:t>
+            </a:r>
+            <a:r>
+              <a:rPr lang="en-US" dirty="0"/>
+              <a:t>isvolunteer</a:t>
+            </a:r>
+            <a:endParaRPr lang="en-US" b="1" dirty="0"/>
+          </a:p>
+          <a:p>
+            <a:pPr algn="ctr"/>
+            <a:r>
+              <a:rPr lang="en-US" b="1" dirty="0"/>
+              <a:t>s</a:t>
+            </a:r>
             <a:r>
               <a:rPr lang="en-US" b="1" dirty="0" smtClean="0"/>
-              <a:t>Array</a:t>
-            </a:r>
-            <a:r>
-              <a:rPr lang="en-US" dirty="0" smtClean="0"/>
-              <a:t> DisasterEvent</a:t>
-            </a:r>
-            <a:endParaRPr lang="en-US" dirty="0" smtClean="0"/>
-          </a:p>
-          <a:p>
-            <a:pPr algn="ctr"/>
-            <a:r>
-              <a:rPr lang="en-US" b="1" dirty="0" smtClean="0"/>
-              <a:t>Array</a:t>
-            </a:r>
-            <a:r>
-              <a:rPr lang="en-US" dirty="0" smtClean="0"/>
-              <a:t> DisasterEventStatus</a:t>
-            </a:r>
-            <a:endParaRPr lang="en-US" dirty="0" smtClean="0"/>
-          </a:p>
-          <a:p>
-            <a:pPr algn="ctr"/>
-            <a:r>
-              <a:rPr lang="en-US" b="1" dirty="0" smtClean="0"/>
-              <a:t>Boolean</a:t>
-            </a:r>
-            <a:r>
-              <a:rPr lang="en-US" dirty="0" smtClean="0"/>
-              <a:t> isVolunteer </a:t>
-            </a:r>
-          </a:p>
-          <a:p>
-            <a:pPr algn="ctr"/>
-            <a:endParaRPr lang="en-US" dirty="0"/>
+              <a:t>tring </a:t>
+            </a:r>
+            <a:r>
+              <a:rPr lang="en-US" dirty="0"/>
+              <a:t>statusLiving</a:t>
+            </a:r>
           </a:p>
         </p:txBody>
       </p:sp>
@@ -4157,7 +4136,7 @@
         </p:nvSpPr>
         <p:spPr>
           <a:xfrm>
-            <a:off x="4863295" y="225632"/>
+            <a:off x="163973" y="300942"/>
             <a:ext cx="3343156" cy="2749062"/>
           </a:xfrm>
           <a:prstGeom prst="rect">
@@ -4189,8 +4168,9 @@
             <a:pPr algn="ctr"/>
             <a:r>
               <a:rPr lang="en-US" b="1" u="sng" dirty="0" smtClean="0"/>
-              <a:t>NGO</a:t>
-            </a:r>
+              <a:t>NGO: Data Model</a:t>
+            </a:r>
+            <a:endParaRPr lang="en-US" b="1" u="sng" dirty="0" smtClean="0"/>
           </a:p>
           <a:p>
             <a:pPr algn="ctr"/>
@@ -4199,83 +4179,77 @@
           <a:p>
             <a:pPr algn="ctr"/>
             <a:r>
+              <a:rPr lang="en-US" b="1" dirty="0"/>
+              <a:t>a</a:t>
+            </a:r>
+            <a:r>
               <a:rPr lang="en-US" b="1" dirty="0" smtClean="0"/>
-              <a:t>String</a:t>
+              <a:t>ccount_name </a:t>
             </a:r>
             <a:r>
               <a:rPr lang="en-US" dirty="0" smtClean="0"/>
-              <a:t> Name</a:t>
-            </a:r>
-          </a:p>
-          <a:p>
-            <a:pPr algn="ctr"/>
+              <a:t>account</a:t>
+            </a:r>
+            <a:endParaRPr lang="en-US" dirty="0" smtClean="0"/>
+          </a:p>
+          <a:p>
+            <a:pPr algn="ctr"/>
+            <a:r>
+              <a:rPr lang="en-US" b="1" dirty="0"/>
+              <a:t>a</a:t>
+            </a:r>
             <a:r>
               <a:rPr lang="en-US" b="1" dirty="0" smtClean="0"/>
-              <a:t>String</a:t>
+              <a:t>sset </a:t>
             </a:r>
             <a:r>
               <a:rPr lang="en-US" dirty="0" smtClean="0"/>
-              <a:t> IDNumber</a:t>
-            </a:r>
-          </a:p>
-          <a:p>
-            <a:pPr algn="ctr"/>
+              <a:t>ngo_balance</a:t>
+            </a:r>
+          </a:p>
+          <a:p>
+            <a:pPr algn="ctr"/>
+            <a:r>
+              <a:rPr lang="en-US" b="1" dirty="0"/>
+              <a:t>s</a:t>
+            </a:r>
             <a:r>
               <a:rPr lang="en-US" b="1" dirty="0" smtClean="0"/>
-              <a:t>INT</a:t>
+              <a:t>tring </a:t>
             </a:r>
             <a:r>
               <a:rPr lang="en-US" dirty="0" smtClean="0"/>
-              <a:t> TotalVolunteers</a:t>
+              <a:t>ngo_name</a:t>
+            </a:r>
+            <a:endParaRPr lang="en-US" dirty="0" smtClean="0"/>
+          </a:p>
+          <a:p>
+            <a:pPr algn="ctr"/>
+            <a:r>
+              <a:rPr lang="en-US" b="1" dirty="0"/>
+              <a:t>i</a:t>
+            </a:r>
+            <a:r>
+              <a:rPr lang="en-US" b="1" dirty="0" smtClean="0"/>
+              <a:t>nt32 </a:t>
+            </a:r>
+            <a:r>
+              <a:rPr lang="en-US" dirty="0" smtClean="0"/>
+              <a:t>totalvolunteers</a:t>
             </a:r>
             <a:endParaRPr lang="en-US" b="1" dirty="0" smtClean="0"/>
           </a:p>
           <a:p>
             <a:pPr algn="ctr"/>
             <a:r>
-              <a:rPr lang="en-US" b="1" dirty="0"/>
-              <a:t>INT</a:t>
-            </a:r>
-            <a:r>
-              <a:rPr lang="en-US" dirty="0"/>
-              <a:t> </a:t>
+              <a:rPr lang="en-US" b="1" dirty="0" smtClean="0"/>
+              <a:t>int32 </a:t>
             </a:r>
             <a:r>
               <a:rPr lang="en-US" dirty="0" smtClean="0"/>
-              <a:t>ActiveVolunteers</a:t>
+              <a:t>activevolunteers</a:t>
             </a:r>
             <a:endParaRPr lang="en-US" dirty="0"/>
-          </a:p>
-          <a:p>
-            <a:pPr algn="ctr"/>
-            <a:r>
-              <a:rPr lang="en-US" b="1" dirty="0" smtClean="0"/>
-              <a:t>Array</a:t>
-            </a:r>
-            <a:r>
-              <a:rPr lang="en-US" dirty="0" smtClean="0"/>
-              <a:t> DisasterEvent </a:t>
-            </a:r>
-          </a:p>
-          <a:p>
-            <a:pPr algn="ctr"/>
-            <a:r>
-              <a:rPr lang="en-US" b="1" dirty="0"/>
-              <a:t>Array</a:t>
-            </a:r>
-            <a:r>
-              <a:rPr lang="en-US" dirty="0"/>
-              <a:t> </a:t>
-            </a:r>
-            <a:r>
-              <a:rPr lang="en-US" dirty="0" smtClean="0"/>
-              <a:t>ActiveDisasterEvent </a:t>
-            </a:r>
-            <a:endParaRPr lang="en-US" dirty="0"/>
-          </a:p>
-          <a:p>
-            <a:pPr algn="ctr"/>
-            <a:endParaRPr lang="en-US" dirty="0" smtClean="0"/>
           </a:p>
         </p:txBody>
       </p:sp>
@@ -4287,8 +4261,8 @@
         </p:nvSpPr>
         <p:spPr>
           <a:xfrm>
-            <a:off x="8335701" y="208345"/>
-            <a:ext cx="3655672" cy="6111433"/>
+            <a:off x="7375002" y="300943"/>
+            <a:ext cx="4234405" cy="6111433"/>
           </a:xfrm>
           <a:prstGeom prst="rect">
             <a:avLst/>
@@ -4325,10 +4299,19 @@
           </a:p>
           <a:p>
             <a:pPr algn="ctr"/>
+            <a:endParaRPr lang="en-US" b="1" u="sng" dirty="0" smtClean="0"/>
+          </a:p>
+          <a:p>
+            <a:pPr algn="ctr"/>
+            <a:r>
+              <a:rPr lang="en-US" b="1" u="sng" dirty="0"/>
+              <a:t>DisasterEvent: Data </a:t>
+            </a:r>
             <a:r>
               <a:rPr lang="en-US" b="1" u="sng" dirty="0" smtClean="0"/>
-              <a:t>DisasterEvent</a:t>
-            </a:r>
+              <a:t>Model</a:t>
+            </a:r>
+            <a:endParaRPr lang="en-US" b="1" u="sng" dirty="0" smtClean="0"/>
           </a:p>
           <a:p>
             <a:pPr algn="ctr"/>
@@ -4337,253 +4320,247 @@
           <a:p>
             <a:pPr algn="ctr"/>
             <a:r>
+              <a:rPr lang="en-US" b="1" dirty="0"/>
+              <a:t>account_name </a:t>
+            </a:r>
+            <a:r>
+              <a:rPr lang="en-US" dirty="0"/>
+              <a:t>account</a:t>
+            </a:r>
+          </a:p>
+          <a:p>
+            <a:pPr algn="ctr"/>
+            <a:r>
+              <a:rPr lang="en-US" b="1" dirty="0"/>
+              <a:t>asset </a:t>
+            </a:r>
+            <a:r>
+              <a:rPr lang="en-US" dirty="0"/>
+              <a:t>disaster</a:t>
+            </a:r>
+            <a:r>
+              <a:rPr lang="en-US" dirty="0" smtClean="0"/>
+              <a:t>_bal</a:t>
+            </a:r>
+            <a:endParaRPr lang="en-US" dirty="0"/>
+          </a:p>
+          <a:p>
+            <a:pPr algn="ctr"/>
+            <a:r>
+              <a:rPr lang="en-US" b="1" dirty="0"/>
+              <a:t>string </a:t>
+            </a:r>
+            <a:r>
+              <a:rPr lang="en-US" dirty="0"/>
+              <a:t>disaster_name</a:t>
+            </a:r>
+          </a:p>
+          <a:p>
+            <a:pPr algn="ctr"/>
+            <a:r>
+              <a:rPr lang="en-US" b="1" dirty="0"/>
+              <a:t>bool </a:t>
+            </a:r>
+            <a:r>
+              <a:rPr lang="en-US" dirty="0"/>
+              <a:t>statusEvent</a:t>
+            </a:r>
+            <a:endParaRPr lang="en-US" b="1" dirty="0"/>
+          </a:p>
+          <a:p>
+            <a:pPr algn="ctr"/>
+            <a:r>
+              <a:rPr lang="en-US" b="1" dirty="0"/>
+              <a:t> int32 </a:t>
+            </a:r>
+            <a:r>
+              <a:rPr lang="en-US" dirty="0" smtClean="0"/>
+              <a:t>totalfoodsupplies</a:t>
+            </a:r>
+          </a:p>
+          <a:p>
+            <a:pPr algn="ctr"/>
+            <a:r>
               <a:rPr lang="en-US" b="1" dirty="0" smtClean="0"/>
-              <a:t>String</a:t>
+              <a:t> </a:t>
+            </a:r>
+            <a:r>
+              <a:rPr lang="en-US" b="1" dirty="0"/>
+              <a:t>int32 </a:t>
             </a:r>
             <a:r>
               <a:rPr lang="en-US" dirty="0" smtClean="0"/>
-              <a:t> Name</a:t>
+              <a:t>usedfoodsupplies</a:t>
             </a:r>
           </a:p>
           <a:p>
             <a:pPr algn="ctr"/>
             <a:r>
               <a:rPr lang="en-US" b="1" dirty="0" smtClean="0"/>
-              <a:t>String</a:t>
+              <a:t> </a:t>
+            </a:r>
+            <a:r>
+              <a:rPr lang="en-US" b="1" dirty="0"/>
+              <a:t>int32 </a:t>
             </a:r>
             <a:r>
               <a:rPr lang="en-US" dirty="0" smtClean="0"/>
-              <a:t> IDNumber</a:t>
+              <a:t>totalclothessupplies</a:t>
             </a:r>
           </a:p>
           <a:p>
             <a:pPr algn="ctr"/>
             <a:r>
               <a:rPr lang="en-US" b="1" dirty="0" smtClean="0"/>
-              <a:t>String</a:t>
+              <a:t> </a:t>
+            </a:r>
+            <a:r>
+              <a:rPr lang="en-US" b="1" dirty="0"/>
+              <a:t>int32 </a:t>
             </a:r>
             <a:r>
               <a:rPr lang="en-US" dirty="0" smtClean="0"/>
-              <a:t> Status</a:t>
-            </a:r>
-          </a:p>
-          <a:p>
-            <a:pPr algn="ctr"/>
+              <a:t>usedclothessupplies</a:t>
+            </a:r>
+          </a:p>
+          <a:p>
+            <a:pPr algn="ctr"/>
+            <a:r>
+              <a:rPr lang="en-US" b="1" dirty="0" smtClean="0"/>
+              <a:t> </a:t>
+            </a:r>
             <a:r>
               <a:rPr lang="en-US" b="1" dirty="0"/>
-              <a:t>INT</a:t>
-            </a:r>
-            <a:r>
-              <a:rPr lang="en-US" dirty="0"/>
+              <a:t>int32 </a:t>
+            </a:r>
+            <a:r>
+              <a:rPr lang="en-US" dirty="0" smtClean="0"/>
+              <a:t>totalwatersupplies</a:t>
+            </a:r>
+            <a:endParaRPr lang="en-US" dirty="0"/>
+          </a:p>
+          <a:p>
+            <a:pPr algn="ctr"/>
+            <a:r>
+              <a:rPr lang="en-US" b="1" dirty="0" smtClean="0"/>
               <a:t> </a:t>
             </a:r>
             <a:r>
+              <a:rPr lang="en-US" b="1" dirty="0"/>
+              <a:t>int32 </a:t>
+            </a:r>
+            <a:r>
               <a:rPr lang="en-US" dirty="0" smtClean="0"/>
-              <a:t>TotalFoodSupplies</a:t>
-            </a:r>
-            <a:endParaRPr lang="en-US" b="1" dirty="0" smtClean="0"/>
-          </a:p>
-          <a:p>
-            <a:pPr algn="ctr"/>
+              <a:t>usedwatersupplies</a:t>
+            </a:r>
+          </a:p>
+          <a:p>
+            <a:pPr algn="ctr"/>
+            <a:r>
+              <a:rPr lang="en-US" b="1" dirty="0" smtClean="0"/>
+              <a:t> </a:t>
+            </a:r>
             <a:r>
               <a:rPr lang="en-US" b="1" dirty="0"/>
-              <a:t>INT</a:t>
-            </a:r>
-            <a:r>
-              <a:rPr lang="en-US" dirty="0"/>
+              <a:t>int32 </a:t>
+            </a:r>
+            <a:r>
+              <a:rPr lang="en-US" dirty="0" smtClean="0"/>
+              <a:t>totalsheltersupplies</a:t>
+            </a:r>
+            <a:endParaRPr lang="en-US" dirty="0"/>
+          </a:p>
+          <a:p>
+            <a:pPr algn="ctr"/>
+            <a:r>
+              <a:rPr lang="en-US" b="1" dirty="0" smtClean="0"/>
               <a:t> </a:t>
             </a:r>
             <a:r>
+              <a:rPr lang="en-US" b="1" dirty="0"/>
+              <a:t>int32 </a:t>
+            </a:r>
+            <a:r>
               <a:rPr lang="en-US" dirty="0" smtClean="0"/>
-              <a:t>UsedFoodSupplies</a:t>
-            </a:r>
-            <a:endParaRPr lang="en-US" b="1" dirty="0"/>
+              <a:t>usedsheltersupplies</a:t>
+            </a:r>
           </a:p>
           <a:p>
             <a:pPr algn="ctr"/>
             <a:r>
               <a:rPr lang="en-US" b="1" dirty="0" smtClean="0"/>
-              <a:t>INT</a:t>
+              <a:t> </a:t>
+            </a:r>
+            <a:r>
+              <a:rPr lang="en-US" b="1" dirty="0"/>
+              <a:t>int32 </a:t>
             </a:r>
             <a:r>
               <a:rPr lang="en-US" dirty="0" smtClean="0"/>
-              <a:t> TotalClothesSupplies</a:t>
-            </a:r>
-            <a:endParaRPr lang="en-US" b="1" dirty="0" smtClean="0"/>
-          </a:p>
-          <a:p>
-            <a:pPr algn="ctr"/>
+              <a:t>totalmedicalsupplies</a:t>
+            </a:r>
+          </a:p>
+          <a:p>
+            <a:pPr algn="ctr"/>
+            <a:r>
+              <a:rPr lang="en-US" b="1" dirty="0" smtClean="0"/>
+              <a:t> </a:t>
+            </a:r>
             <a:r>
               <a:rPr lang="en-US" b="1" dirty="0"/>
-              <a:t>INT</a:t>
-            </a:r>
-            <a:r>
-              <a:rPr lang="en-US" dirty="0"/>
+              <a:t>int32 </a:t>
+            </a:r>
+            <a:r>
+              <a:rPr lang="en-US" dirty="0" smtClean="0"/>
+              <a:t>usedmedicalsupplies</a:t>
+            </a:r>
+            <a:endParaRPr lang="en-US" dirty="0"/>
+          </a:p>
+          <a:p>
+            <a:pPr algn="ctr"/>
+            <a:r>
+              <a:rPr lang="en-US" b="1" dirty="0" smtClean="0"/>
               <a:t> </a:t>
             </a:r>
             <a:r>
+              <a:rPr lang="en-US" b="1" dirty="0"/>
+              <a:t>int32 </a:t>
+            </a:r>
+            <a:r>
               <a:rPr lang="en-US" dirty="0" smtClean="0"/>
-              <a:t>UsedClothesSupplies</a:t>
+              <a:t>totalvolunteers</a:t>
+            </a:r>
+          </a:p>
+          <a:p>
+            <a:pPr algn="ctr"/>
+            <a:r>
+              <a:rPr lang="en-US" b="1" dirty="0" smtClean="0"/>
+              <a:t> </a:t>
+            </a:r>
+            <a:r>
+              <a:rPr lang="en-US" b="1" dirty="0"/>
+              <a:t>int32 </a:t>
+            </a:r>
+            <a:r>
+              <a:rPr lang="en-US" dirty="0" smtClean="0"/>
+              <a:t>activevolunteers</a:t>
+            </a:r>
+          </a:p>
+          <a:p>
+            <a:pPr algn="ctr"/>
+            <a:r>
+              <a:rPr lang="en-US" b="1" dirty="0" smtClean="0"/>
+              <a:t> </a:t>
+            </a:r>
+            <a:r>
+              <a:rPr lang="en-US" b="1" dirty="0"/>
+              <a:t>int32 </a:t>
+            </a:r>
+            <a:r>
+              <a:rPr lang="en-US" dirty="0" smtClean="0"/>
+              <a:t>reliefedcitizens</a:t>
             </a:r>
             <a:endParaRPr lang="en-US" dirty="0"/>
-          </a:p>
-          <a:p>
-            <a:pPr algn="ctr"/>
-            <a:r>
-              <a:rPr lang="en-US" b="1" dirty="0" smtClean="0"/>
-              <a:t>INT</a:t>
-            </a:r>
-            <a:r>
-              <a:rPr lang="en-US" dirty="0" smtClean="0"/>
-              <a:t> TotalWaterSupplies</a:t>
-            </a:r>
-            <a:endParaRPr lang="en-US" dirty="0" smtClean="0"/>
-          </a:p>
-          <a:p>
-            <a:pPr algn="ctr"/>
-            <a:r>
-              <a:rPr lang="en-US" b="1" dirty="0"/>
-              <a:t>INT</a:t>
-            </a:r>
-            <a:r>
-              <a:rPr lang="en-US" dirty="0"/>
-              <a:t> </a:t>
-            </a:r>
-            <a:r>
-              <a:rPr lang="en-US" dirty="0" smtClean="0"/>
-              <a:t>UsedWaterSupplies</a:t>
-            </a:r>
-            <a:endParaRPr lang="en-US" dirty="0"/>
-          </a:p>
-          <a:p>
-            <a:pPr algn="ctr"/>
-            <a:r>
-              <a:rPr lang="en-US" b="1" dirty="0" smtClean="0"/>
-              <a:t>INT</a:t>
-            </a:r>
-            <a:r>
-              <a:rPr lang="en-US" dirty="0" smtClean="0"/>
-              <a:t> TotalShelterSupplies</a:t>
-            </a:r>
-            <a:endParaRPr lang="en-US" dirty="0" smtClean="0"/>
-          </a:p>
-          <a:p>
-            <a:pPr algn="ctr"/>
-            <a:r>
-              <a:rPr lang="en-US" b="1" dirty="0"/>
-              <a:t>INT</a:t>
-            </a:r>
-            <a:r>
-              <a:rPr lang="en-US" dirty="0"/>
-              <a:t> </a:t>
-            </a:r>
-            <a:r>
-              <a:rPr lang="en-US" dirty="0" smtClean="0"/>
-              <a:t>UsedShelterSupplies</a:t>
-            </a:r>
-            <a:endParaRPr lang="en-US" dirty="0"/>
-          </a:p>
-          <a:p>
-            <a:pPr algn="ctr"/>
-            <a:r>
-              <a:rPr lang="en-US" b="1" dirty="0" smtClean="0"/>
-              <a:t>INT</a:t>
-            </a:r>
-            <a:r>
-              <a:rPr lang="en-US" dirty="0" smtClean="0"/>
-              <a:t> TotalMedicalSupplies</a:t>
-            </a:r>
-            <a:endParaRPr lang="en-US" b="1" dirty="0"/>
-          </a:p>
-          <a:p>
-            <a:pPr algn="ctr"/>
-            <a:r>
-              <a:rPr lang="en-US" b="1" dirty="0"/>
-              <a:t>INT</a:t>
-            </a:r>
-            <a:r>
-              <a:rPr lang="en-US" dirty="0"/>
-              <a:t> </a:t>
-            </a:r>
-            <a:r>
-              <a:rPr lang="en-US" dirty="0" smtClean="0"/>
-              <a:t>UsedMedicalSupplies</a:t>
-            </a:r>
-            <a:endParaRPr lang="en-US" b="1" dirty="0" smtClean="0"/>
-          </a:p>
-          <a:p>
-            <a:pPr algn="ctr"/>
-            <a:r>
-              <a:rPr lang="en-US" b="1" dirty="0" smtClean="0"/>
-              <a:t>INT</a:t>
-            </a:r>
-            <a:r>
-              <a:rPr lang="en-US" dirty="0" smtClean="0"/>
-              <a:t> </a:t>
-            </a:r>
-            <a:r>
-              <a:rPr lang="en-US" dirty="0"/>
-              <a:t>TotalVolunteers</a:t>
-            </a:r>
-            <a:endParaRPr lang="en-US" b="1" dirty="0"/>
-          </a:p>
-          <a:p>
-            <a:pPr algn="ctr"/>
-            <a:r>
-              <a:rPr lang="en-US" b="1" dirty="0"/>
-              <a:t>INT</a:t>
-            </a:r>
-            <a:r>
-              <a:rPr lang="en-US" dirty="0"/>
-              <a:t> ActiveVolunteers</a:t>
-            </a:r>
-          </a:p>
-          <a:p>
-            <a:pPr algn="ctr"/>
-            <a:r>
-              <a:rPr lang="en-US" b="1" dirty="0"/>
-              <a:t>INT</a:t>
-            </a:r>
-            <a:r>
-              <a:rPr lang="en-US" dirty="0"/>
-              <a:t> </a:t>
-            </a:r>
-            <a:r>
-              <a:rPr lang="en-US" dirty="0" smtClean="0"/>
-              <a:t>TotalAffectedCitizens</a:t>
-            </a:r>
-            <a:endParaRPr lang="en-US" b="1" dirty="0"/>
-          </a:p>
-          <a:p>
-            <a:pPr algn="ctr"/>
-            <a:r>
-              <a:rPr lang="en-US" b="1" dirty="0"/>
-              <a:t>INT</a:t>
-            </a:r>
-            <a:r>
-              <a:rPr lang="en-US" dirty="0"/>
-              <a:t> </a:t>
-            </a:r>
-            <a:r>
-              <a:rPr lang="en-US" dirty="0" smtClean="0"/>
-              <a:t>ReliefedCitizens</a:t>
-            </a:r>
-          </a:p>
-          <a:p>
-            <a:pPr algn="ctr"/>
-            <a:r>
-              <a:rPr lang="en-US" b="1" dirty="0" smtClean="0"/>
-              <a:t>Array</a:t>
-            </a:r>
-            <a:r>
-              <a:rPr lang="en-US" dirty="0" smtClean="0"/>
-              <a:t> CitizenIDNumber</a:t>
-            </a:r>
-            <a:endParaRPr lang="en-US" dirty="0" smtClean="0"/>
-          </a:p>
-          <a:p>
-            <a:pPr algn="ctr"/>
-            <a:endParaRPr lang="en-US" b="1" dirty="0"/>
           </a:p>
           <a:p>
             <a:pPr algn="ctr"/>
@@ -4642,45 +4619,14 @@
       </p:grpSpPr>
       <p:sp>
         <p:nvSpPr>
-          <p:cNvPr id="5" name="TextBox 4"/>
-          <p:cNvSpPr txBox="1"/>
-          <p:nvPr/>
-        </p:nvSpPr>
-        <p:spPr>
-          <a:xfrm>
-            <a:off x="277791" y="300942"/>
-            <a:ext cx="11019099" cy="769441"/>
-          </a:xfrm>
-          <a:prstGeom prst="rect">
-            <a:avLst/>
-          </a:prstGeom>
-          <a:noFill/>
-        </p:spPr>
-        <p:txBody>
-          <a:bodyPr wrap="square" rtlCol="0">
-            <a:spAutoFit/>
-          </a:bodyPr>
-          <a:lstStyle/>
-          <a:p>
-            <a:pPr algn="ctr"/>
-            <a:r>
-              <a:rPr lang="en-US" sz="4400" b="1" u="sng" dirty="0" smtClean="0"/>
-              <a:t>Action: SmartContract</a:t>
-            </a:r>
-            <a:endParaRPr lang="en-US" sz="4400" b="1" u="sng" dirty="0"/>
-          </a:p>
-        </p:txBody>
-      </p:sp>
-      <p:sp>
-        <p:nvSpPr>
           <p:cNvPr id="6" name="Rectangle 5"/>
           <p:cNvSpPr/>
           <p:nvPr/>
         </p:nvSpPr>
         <p:spPr>
           <a:xfrm>
-            <a:off x="1643605" y="2755671"/>
-            <a:ext cx="4202580" cy="2860215"/>
+            <a:off x="1365813" y="398506"/>
+            <a:ext cx="4525701" cy="2275246"/>
           </a:xfrm>
           <a:prstGeom prst="rect">
             <a:avLst/>
@@ -4705,109 +4651,90 @@
           <a:lstStyle/>
           <a:p>
             <a:pPr algn="ctr"/>
-            <a:endParaRPr lang="en-US" dirty="0" smtClean="0"/>
-          </a:p>
-          <a:p>
-            <a:pPr algn="ctr"/>
-            <a:r>
-              <a:rPr lang="en-US" b="1" dirty="0" smtClean="0"/>
+            <a:endParaRPr lang="en-US" sz="1200" dirty="0" smtClean="0"/>
+          </a:p>
+          <a:p>
+            <a:pPr algn="ctr"/>
+            <a:r>
+              <a:rPr lang="en-US" sz="1200" b="1" dirty="0" smtClean="0"/>
               <a:t>Smart Contract: </a:t>
             </a:r>
             <a:r>
-              <a:rPr lang="en-US" dirty="0" smtClean="0"/>
-              <a:t>Disaster Event</a:t>
-            </a:r>
-          </a:p>
-          <a:p>
-            <a:pPr algn="ctr"/>
-            <a:endParaRPr lang="en-US" dirty="0" smtClean="0"/>
-          </a:p>
-          <a:p>
-            <a:pPr algn="ctr"/>
-            <a:r>
-              <a:rPr lang="en-US" b="1" dirty="0" smtClean="0"/>
-              <a:t> </a:t>
-            </a:r>
-            <a:r>
-              <a:rPr lang="en-US" b="1" dirty="0" smtClean="0"/>
-              <a:t>Action</a:t>
-            </a:r>
-            <a:r>
-              <a:rPr lang="en-US" dirty="0" smtClean="0"/>
-              <a:t>: VerificationofCitizen(</a:t>
-            </a:r>
-          </a:p>
-          <a:p>
-            <a:pPr algn="ctr"/>
-            <a:r>
-              <a:rPr lang="en-US" dirty="0" smtClean="0"/>
-              <a:t>CitizenAccountName ,UsedFoodSupplies,</a:t>
-            </a:r>
-            <a:r>
-              <a:rPr lang="en-US" dirty="0"/>
-              <a:t> </a:t>
-            </a:r>
-            <a:r>
-              <a:rPr lang="en-US" dirty="0" smtClean="0"/>
-              <a:t>UsedClothesSupplies,</a:t>
-            </a:r>
-            <a:r>
-              <a:rPr lang="en-US" dirty="0"/>
-              <a:t> </a:t>
-            </a:r>
-            <a:r>
-              <a:rPr lang="en-US" dirty="0" smtClean="0"/>
-              <a:t>UsedWaterSupplies,</a:t>
-            </a:r>
-            <a:r>
-              <a:rPr lang="en-US" dirty="0"/>
-              <a:t> </a:t>
-            </a:r>
-            <a:r>
-              <a:rPr lang="en-US" dirty="0" smtClean="0"/>
-              <a:t>UsedShelterSupplies,</a:t>
-            </a:r>
-            <a:r>
-              <a:rPr lang="en-US" dirty="0"/>
-              <a:t> </a:t>
-            </a:r>
-            <a:r>
-              <a:rPr lang="en-US" dirty="0" smtClean="0"/>
-              <a:t>UsedMedicalSupplies)</a:t>
-            </a:r>
-          </a:p>
-          <a:p>
-            <a:pPr algn="ctr"/>
-            <a:endParaRPr lang="en-US" dirty="0"/>
-          </a:p>
-          <a:p>
-            <a:pPr algn="ctr"/>
-            <a:r>
-              <a:rPr lang="en-US" dirty="0" smtClean="0"/>
+              <a:rPr lang="en-US" sz="1200" dirty="0" smtClean="0"/>
+              <a:t>ReliefChain</a:t>
+            </a:r>
+            <a:endParaRPr lang="en-US" sz="1200" dirty="0" smtClean="0"/>
+          </a:p>
+          <a:p>
+            <a:pPr algn="ctr"/>
+            <a:endParaRPr lang="en-US" sz="1200" dirty="0" smtClean="0"/>
+          </a:p>
+          <a:p>
+            <a:pPr algn="ctr"/>
+            <a:r>
+              <a:rPr lang="en-US" sz="1200" b="1" dirty="0" smtClean="0"/>
+              <a:t> Action</a:t>
+            </a:r>
+            <a:r>
+              <a:rPr lang="en-US" sz="1200" dirty="0" smtClean="0"/>
+              <a:t>: </a:t>
+            </a:r>
+            <a:r>
+              <a:rPr lang="en-US" sz="1200" dirty="0" smtClean="0"/>
+              <a:t>verifycits </a:t>
+            </a:r>
+            <a:r>
+              <a:rPr lang="en-US" sz="1200" dirty="0"/>
+              <a:t>(const account_name citizen_account, const account_name disaster_account, uint32_t usedfoodsupplies, uint32_t usedclothessupplies, uint32_t usedwatersupplies, uint32_t usedsheltersupplies, uint32_t usedmedicalsupplies, const string&amp; statusLiving</a:t>
+            </a:r>
+            <a:r>
+              <a:rPr lang="en-US" sz="1200" dirty="0" smtClean="0"/>
+              <a:t>);</a:t>
+            </a:r>
+          </a:p>
+          <a:p>
+            <a:pPr algn="ctr"/>
+            <a:endParaRPr lang="en-US" sz="1200" dirty="0"/>
+          </a:p>
+          <a:p>
+            <a:pPr algn="ctr"/>
+            <a:r>
+              <a:rPr lang="en-US" sz="1200" dirty="0" smtClean="0"/>
               <a:t># </a:t>
             </a:r>
             <a:r>
-              <a:rPr lang="en-US" dirty="0"/>
-              <a:t>Update table: DisasterEvent</a:t>
-            </a:r>
-            <a:endParaRPr lang="en-US" dirty="0" smtClean="0"/>
-          </a:p>
-          <a:p>
-            <a:pPr algn="ctr"/>
-            <a:endParaRPr lang="en-US" dirty="0"/>
-          </a:p>
-        </p:txBody>
-      </p:sp>
-      <p:sp>
-        <p:nvSpPr>
-          <p:cNvPr id="7" name="Rectangle 6"/>
+              <a:rPr lang="en-US" sz="1200" dirty="0"/>
+              <a:t>Update table: </a:t>
+            </a:r>
+            <a:r>
+              <a:rPr lang="en-US" sz="1200" dirty="0" smtClean="0"/>
+              <a:t>DisasterEvent</a:t>
+            </a:r>
+          </a:p>
+          <a:p>
+            <a:pPr algn="ctr"/>
+            <a:r>
+              <a:rPr lang="en-US" sz="1200" dirty="0" smtClean="0"/>
+              <a:t>#Update table: Citizen</a:t>
+            </a:r>
+            <a:endParaRPr lang="en-US" sz="1200" dirty="0" smtClean="0"/>
+          </a:p>
+          <a:p>
+            <a:pPr algn="ctr"/>
+            <a:endParaRPr lang="en-US" sz="1200" dirty="0"/>
+          </a:p>
+        </p:txBody>
+      </p:sp>
+      <p:sp>
+        <p:nvSpPr>
+          <p:cNvPr id="9" name="Rectangle 8"/>
           <p:cNvSpPr/>
           <p:nvPr/>
         </p:nvSpPr>
         <p:spPr>
           <a:xfrm>
-            <a:off x="6042946" y="2755671"/>
-            <a:ext cx="4202580" cy="1422789"/>
+            <a:off x="6111432" y="398505"/>
+            <a:ext cx="4479403" cy="2275247"/>
           </a:xfrm>
           <a:prstGeom prst="rect">
             <a:avLst/>
@@ -4832,65 +4759,86 @@
           <a:lstStyle/>
           <a:p>
             <a:pPr algn="ctr"/>
-            <a:endParaRPr lang="en-US" dirty="0" smtClean="0"/>
-          </a:p>
-          <a:p>
-            <a:pPr algn="ctr"/>
-            <a:endParaRPr lang="en-US" b="1" dirty="0" smtClean="0"/>
-          </a:p>
-          <a:p>
-            <a:pPr algn="ctr"/>
-            <a:r>
-              <a:rPr lang="en-US" b="1" dirty="0" smtClean="0"/>
+            <a:endParaRPr lang="en-US" sz="1200" dirty="0" smtClean="0"/>
+          </a:p>
+          <a:p>
+            <a:pPr algn="ctr"/>
+            <a:r>
+              <a:rPr lang="en-US" sz="1200" b="1" dirty="0" smtClean="0"/>
               <a:t>Smart Contract: </a:t>
             </a:r>
             <a:r>
-              <a:rPr lang="en-US" dirty="0" smtClean="0"/>
-              <a:t>Disaster Event</a:t>
-            </a:r>
-          </a:p>
-          <a:p>
-            <a:pPr algn="ctr"/>
-            <a:r>
-              <a:rPr lang="en-US" b="1" dirty="0" smtClean="0"/>
-              <a:t> </a:t>
-            </a:r>
-            <a:r>
-              <a:rPr lang="en-US" b="1" dirty="0" smtClean="0"/>
-              <a:t>Action</a:t>
-            </a:r>
-            <a:r>
-              <a:rPr lang="en-US" dirty="0" smtClean="0"/>
-              <a:t>: ReadDisasterEvent()</a:t>
-            </a:r>
-          </a:p>
-          <a:p>
-            <a:pPr algn="ctr"/>
-            <a:endParaRPr lang="en-US" dirty="0"/>
-          </a:p>
-          <a:p>
-            <a:pPr algn="ctr"/>
-            <a:r>
-              <a:rPr lang="en-US" dirty="0" smtClean="0"/>
-              <a:t># Read table: DisasterEvent</a:t>
-            </a:r>
-          </a:p>
-          <a:p>
-            <a:pPr algn="ctr"/>
-            <a:endParaRPr lang="en-US" dirty="0"/>
-          </a:p>
-        </p:txBody>
-      </p:sp>
-      <p:sp>
-        <p:nvSpPr>
-          <p:cNvPr id="8" name="Rectangle 7"/>
+              <a:rPr lang="en-US" sz="1200" dirty="0"/>
+              <a:t>ReliefChain</a:t>
+            </a:r>
+            <a:endParaRPr lang="en-US" sz="1200" dirty="0" smtClean="0"/>
+          </a:p>
+          <a:p>
+            <a:pPr algn="ctr"/>
+            <a:endParaRPr lang="en-US" sz="1200" dirty="0" smtClean="0"/>
+          </a:p>
+          <a:p>
+            <a:pPr algn="ctr"/>
+            <a:r>
+              <a:rPr lang="en-US" sz="1200" b="1" dirty="0" smtClean="0"/>
+              <a:t> Action</a:t>
+            </a:r>
+            <a:r>
+              <a:rPr lang="en-US" sz="1200" dirty="0" smtClean="0"/>
+              <a:t>: </a:t>
+            </a:r>
+            <a:r>
+              <a:rPr lang="en-US" sz="1200" dirty="0" smtClean="0"/>
+              <a:t>adddisaster </a:t>
+            </a:r>
+            <a:r>
+              <a:rPr lang="en-US" sz="1200" dirty="0"/>
+              <a:t>(const account_name account, const string&amp; disaster_name, const asset&amp; disaster_bal, bool statusEvent, uint32_t totalfoodsupplies, uint32_t usedfoodsupplies, uint32_t totalclothessupplies, uint32_t usedclothessupplies, uint32_t totalwatersupplies, uint32_t usedwatersupplies, uint32_t totalsheltersupplies, uint32_t usedsheltersupplies, uint32_t totalmedicalsupplies, uint32_t usedmedicalsupplies, uint32_t activevolunteers, uint32_t reliefedcitizens</a:t>
+            </a:r>
+            <a:r>
+              <a:rPr lang="en-US" sz="1200" dirty="0" smtClean="0"/>
+              <a:t>);</a:t>
+            </a:r>
+          </a:p>
+          <a:p>
+            <a:pPr algn="ctr"/>
+            <a:endParaRPr lang="en-US" sz="1200" dirty="0"/>
+          </a:p>
+          <a:p>
+            <a:pPr algn="ctr"/>
+            <a:r>
+              <a:rPr lang="en-US" sz="1200" dirty="0" smtClean="0"/>
+              <a:t># </a:t>
+            </a:r>
+            <a:r>
+              <a:rPr lang="en-US" sz="1200" dirty="0" smtClean="0"/>
+              <a:t>Add table</a:t>
+            </a:r>
+            <a:r>
+              <a:rPr lang="en-US" sz="1200" dirty="0"/>
+              <a:t>: </a:t>
+            </a:r>
+            <a:r>
+              <a:rPr lang="en-US" sz="1200" dirty="0" smtClean="0"/>
+              <a:t>Disaster</a:t>
+            </a:r>
+          </a:p>
+          <a:p>
+            <a:pPr algn="ctr"/>
+            <a:endParaRPr lang="en-US" sz="1200" dirty="0"/>
+          </a:p>
+        </p:txBody>
+      </p:sp>
+      <p:sp>
+        <p:nvSpPr>
+          <p:cNvPr id="10" name="Rectangle 9"/>
           <p:cNvSpPr/>
           <p:nvPr/>
         </p:nvSpPr>
         <p:spPr>
           <a:xfrm>
-            <a:off x="6042946" y="4249862"/>
-            <a:ext cx="4202580" cy="1422789"/>
+            <a:off x="1388961" y="2842692"/>
+            <a:ext cx="4479403" cy="2275247"/>
           </a:xfrm>
           <a:prstGeom prst="rect">
             <a:avLst/>
@@ -4915,52 +4863,169 @@
           <a:lstStyle/>
           <a:p>
             <a:pPr algn="ctr"/>
-            <a:endParaRPr lang="en-US" dirty="0" smtClean="0"/>
-          </a:p>
-          <a:p>
-            <a:pPr algn="ctr"/>
-            <a:endParaRPr lang="en-US" b="1" dirty="0" smtClean="0"/>
-          </a:p>
-          <a:p>
-            <a:pPr algn="ctr"/>
-            <a:r>
-              <a:rPr lang="en-US" b="1" dirty="0" smtClean="0"/>
+            <a:endParaRPr lang="en-US" sz="1200" dirty="0" smtClean="0"/>
+          </a:p>
+          <a:p>
+            <a:pPr algn="ctr"/>
+            <a:r>
+              <a:rPr lang="en-US" sz="1200" b="1" dirty="0" smtClean="0"/>
               <a:t>Smart Contract: </a:t>
             </a:r>
             <a:r>
-              <a:rPr lang="en-US" dirty="0" smtClean="0"/>
+              <a:rPr lang="en-US" sz="1200" dirty="0"/>
+              <a:t>ReliefChain</a:t>
+            </a:r>
+            <a:endParaRPr lang="en-US" sz="1200" dirty="0" smtClean="0"/>
+          </a:p>
+          <a:p>
+            <a:pPr algn="ctr"/>
+            <a:endParaRPr lang="en-US" sz="1200" dirty="0" smtClean="0"/>
+          </a:p>
+          <a:p>
+            <a:pPr algn="ctr"/>
+            <a:r>
+              <a:rPr lang="en-US" sz="1200" b="1" dirty="0" smtClean="0"/>
+              <a:t> Action</a:t>
+            </a:r>
+            <a:r>
+              <a:rPr lang="en-US" sz="1200" dirty="0" smtClean="0"/>
+              <a:t>: </a:t>
+            </a:r>
+            <a:r>
+              <a:rPr lang="en-US" sz="1200" dirty="0"/>
+              <a:t>addcitizen (const account_name account, const string&amp; citizen_name, const asset&amp; citizen_bal, bool isvolunteer, const string&amp; statusLiving</a:t>
+            </a:r>
+            <a:r>
+              <a:rPr lang="en-US" sz="1200" dirty="0" smtClean="0"/>
+              <a:t>);</a:t>
+            </a:r>
+          </a:p>
+          <a:p>
+            <a:pPr algn="ctr"/>
+            <a:endParaRPr lang="en-US" sz="1200" dirty="0"/>
+          </a:p>
+          <a:p>
+            <a:pPr algn="ctr"/>
+            <a:r>
+              <a:rPr lang="en-US" sz="1200" dirty="0" smtClean="0"/>
+              <a:t># </a:t>
+            </a:r>
+            <a:r>
+              <a:rPr lang="en-US" sz="1200" dirty="0" smtClean="0"/>
+              <a:t>Add table</a:t>
+            </a:r>
+            <a:r>
+              <a:rPr lang="en-US" sz="1200" dirty="0"/>
+              <a:t>: </a:t>
+            </a:r>
+            <a:r>
+              <a:rPr lang="en-US" sz="1200" dirty="0" smtClean="0"/>
               <a:t>Citizen</a:t>
             </a:r>
           </a:p>
           <a:p>
             <a:pPr algn="ctr"/>
-            <a:r>
-              <a:rPr lang="en-US" b="1" dirty="0" smtClean="0"/>
-              <a:t> </a:t>
-            </a:r>
-            <a:r>
-              <a:rPr lang="en-US" b="1" dirty="0" smtClean="0"/>
-              <a:t>Action</a:t>
-            </a:r>
-            <a:r>
-              <a:rPr lang="en-US" dirty="0" smtClean="0"/>
-              <a:t>: ReadIDNumer()</a:t>
-            </a:r>
-          </a:p>
-          <a:p>
-            <a:pPr algn="ctr"/>
-            <a:endParaRPr lang="en-US" dirty="0"/>
-          </a:p>
-          <a:p>
-            <a:pPr algn="ctr"/>
-            <a:r>
-              <a:rPr lang="en-US" dirty="0" smtClean="0"/>
-              <a:t># Read table: Citizen</a:t>
-            </a:r>
-          </a:p>
-          <a:p>
-            <a:pPr algn="ctr"/>
-            <a:endParaRPr lang="en-US" dirty="0"/>
+            <a:endParaRPr lang="en-US" sz="1200" dirty="0"/>
+          </a:p>
+        </p:txBody>
+      </p:sp>
+      <p:sp>
+        <p:nvSpPr>
+          <p:cNvPr id="11" name="Rectangle 10"/>
+          <p:cNvSpPr/>
+          <p:nvPr/>
+        </p:nvSpPr>
+        <p:spPr>
+          <a:xfrm>
+            <a:off x="6111432" y="2842691"/>
+            <a:ext cx="4479403" cy="2275247"/>
+          </a:xfrm>
+          <a:prstGeom prst="rect">
+            <a:avLst/>
+          </a:prstGeom>
+        </p:spPr>
+        <p:style>
+          <a:lnRef idx="1">
+            <a:schemeClr val="accent3"/>
+          </a:lnRef>
+          <a:fillRef idx="2">
+            <a:schemeClr val="accent3"/>
+          </a:fillRef>
+          <a:effectRef idx="1">
+            <a:schemeClr val="accent3"/>
+          </a:effectRef>
+          <a:fontRef idx="minor">
+            <a:schemeClr val="dk1"/>
+          </a:fontRef>
+        </p:style>
+        <p:txBody>
+          <a:bodyPr rtlCol="0" anchor="ctr"/>
+          <a:lstStyle/>
+          <a:p>
+            <a:pPr algn="ctr"/>
+            <a:endParaRPr lang="en-US" sz="1200" dirty="0" smtClean="0"/>
+          </a:p>
+          <a:p>
+            <a:pPr algn="ctr"/>
+            <a:r>
+              <a:rPr lang="en-US" sz="1200" b="1" dirty="0" smtClean="0"/>
+              <a:t>Smart Contract: </a:t>
+            </a:r>
+            <a:r>
+              <a:rPr lang="en-US" sz="1200" dirty="0"/>
+              <a:t>ReliefChain</a:t>
+            </a:r>
+            <a:endParaRPr lang="en-US" sz="1200" dirty="0" smtClean="0"/>
+          </a:p>
+          <a:p>
+            <a:pPr algn="ctr"/>
+            <a:endParaRPr lang="en-US" sz="1200" dirty="0" smtClean="0"/>
+          </a:p>
+          <a:p>
+            <a:pPr algn="ctr"/>
+            <a:r>
+              <a:rPr lang="en-US" sz="1200" b="1" dirty="0" smtClean="0"/>
+              <a:t> Action</a:t>
+            </a:r>
+            <a:r>
+              <a:rPr lang="en-US" sz="1200" dirty="0" smtClean="0"/>
+              <a:t>: </a:t>
+            </a:r>
+            <a:r>
+              <a:rPr lang="en-US" sz="1200" dirty="0"/>
+              <a:t>addngo (const account_name account, const string&amp; ngo_name, const asset&amp; ngo_bal, uint32_t totalvolunteers, uint32_t activevolunteers</a:t>
+            </a:r>
+            <a:r>
+              <a:rPr lang="en-US" sz="1200" dirty="0" smtClean="0"/>
+              <a:t>)</a:t>
+            </a:r>
+          </a:p>
+          <a:p>
+            <a:pPr algn="ctr"/>
+            <a:endParaRPr lang="en-US" sz="1200" dirty="0"/>
+          </a:p>
+          <a:p>
+            <a:pPr algn="ctr"/>
+            <a:r>
+              <a:rPr lang="en-US" sz="1200" dirty="0" smtClean="0"/>
+              <a:t># </a:t>
+            </a:r>
+            <a:r>
+              <a:rPr lang="en-US" sz="1200" dirty="0" smtClean="0"/>
+              <a:t>Add table</a:t>
+            </a:r>
+            <a:r>
+              <a:rPr lang="en-US" sz="1200" dirty="0"/>
+              <a:t>: </a:t>
+            </a:r>
+            <a:r>
+              <a:rPr lang="en-US" sz="1200" dirty="0" smtClean="0"/>
+              <a:t>NGO</a:t>
+            </a:r>
+          </a:p>
+          <a:p>
+            <a:pPr algn="ctr"/>
+            <a:endParaRPr lang="en-US" sz="1200" dirty="0"/>
           </a:p>
         </p:txBody>
       </p:sp>

</xml_diff>